<commit_message>
Ultimas alterações no capitulo 2
</commit_message>
<xml_diff>
--- a/Capitulo 2 - Linguagem de Programação.pptx
+++ b/Capitulo 2 - Linguagem de Programação.pptx
@@ -136,6 +136,11 @@
       </a:defRPr>
     </a:lvl9pPr>
   </p:defaultTextStyle>
+  <p:extLst>
+    <p:ext uri="{EFAFB233-063F-42B5-8137-9DF3F51BA10A}">
+      <p15:sldGuideLst xmlns:p15="http://schemas.microsoft.com/office/powerpoint/2012/main"/>
+    </p:ext>
+  </p:extLst>
 </p:presentation>
 </file>
 
@@ -809,7 +814,7 @@
           <p:cNvPr id="2" name="Título 1">
             <a:extLst>
               <a:ext uri="{FF2B5EF4-FFF2-40B4-BE49-F238E27FC236}">
-                <a16:creationId xmlns:a16="http://schemas.microsoft.com/office/drawing/2014/main" id="{BAD175B6-544D-848B-5BC3-4D03EACA0E81}"/>
+                <a16:creationId xmlns:a16="http://schemas.microsoft.com/office/drawing/2014/main" xmlns="" id="{BAD175B6-544D-848B-5BC3-4D03EACA0E81}"/>
               </a:ext>
             </a:extLst>
           </p:cNvPr>
@@ -846,7 +851,7 @@
           <p:cNvPr id="3" name="Subtítulo 2">
             <a:extLst>
               <a:ext uri="{FF2B5EF4-FFF2-40B4-BE49-F238E27FC236}">
-                <a16:creationId xmlns:a16="http://schemas.microsoft.com/office/drawing/2014/main" id="{CC798D23-1830-4C6B-4004-C575A787CDD5}"/>
+                <a16:creationId xmlns:a16="http://schemas.microsoft.com/office/drawing/2014/main" xmlns="" id="{CC798D23-1830-4C6B-4004-C575A787CDD5}"/>
               </a:ext>
             </a:extLst>
           </p:cNvPr>
@@ -916,7 +921,7 @@
           <p:cNvPr id="4" name="Espaço Reservado para Data 3">
             <a:extLst>
               <a:ext uri="{FF2B5EF4-FFF2-40B4-BE49-F238E27FC236}">
-                <a16:creationId xmlns:a16="http://schemas.microsoft.com/office/drawing/2014/main" id="{160EE509-835E-A8F6-FAA1-FBE1CE695CCB}"/>
+                <a16:creationId xmlns:a16="http://schemas.microsoft.com/office/drawing/2014/main" xmlns="" id="{160EE509-835E-A8F6-FAA1-FBE1CE695CCB}"/>
               </a:ext>
             </a:extLst>
           </p:cNvPr>
@@ -934,7 +939,7 @@
           <a:p>
             <a:fld id="{A5D21590-1B13-4BF7-9C26-3F68F7B678FF}" type="datetimeFigureOut">
               <a:rPr lang="pt-BR" smtClean="0"/>
-              <a:t>11/03/2023</a:t>
+              <a:t>14/03/2023</a:t>
             </a:fld>
             <a:endParaRPr lang="pt-BR"/>
           </a:p>
@@ -945,7 +950,7 @@
           <p:cNvPr id="5" name="Espaço Reservado para Rodapé 4">
             <a:extLst>
               <a:ext uri="{FF2B5EF4-FFF2-40B4-BE49-F238E27FC236}">
-                <a16:creationId xmlns:a16="http://schemas.microsoft.com/office/drawing/2014/main" id="{B240D6DE-CA25-DC2D-FBCE-C745BC7A0365}"/>
+                <a16:creationId xmlns:a16="http://schemas.microsoft.com/office/drawing/2014/main" xmlns="" id="{B240D6DE-CA25-DC2D-FBCE-C745BC7A0365}"/>
               </a:ext>
             </a:extLst>
           </p:cNvPr>
@@ -970,7 +975,7 @@
           <p:cNvPr id="6" name="Espaço Reservado para Número de Slide 5">
             <a:extLst>
               <a:ext uri="{FF2B5EF4-FFF2-40B4-BE49-F238E27FC236}">
-                <a16:creationId xmlns:a16="http://schemas.microsoft.com/office/drawing/2014/main" id="{FC353348-E8FB-2C8B-CD08-3F190E8DF868}"/>
+                <a16:creationId xmlns:a16="http://schemas.microsoft.com/office/drawing/2014/main" xmlns="" id="{FC353348-E8FB-2C8B-CD08-3F190E8DF868}"/>
               </a:ext>
             </a:extLst>
           </p:cNvPr>
@@ -1029,7 +1034,7 @@
           <p:cNvPr id="2" name="Título 1">
             <a:extLst>
               <a:ext uri="{FF2B5EF4-FFF2-40B4-BE49-F238E27FC236}">
-                <a16:creationId xmlns:a16="http://schemas.microsoft.com/office/drawing/2014/main" id="{0CE015E4-3294-B668-1072-D2BAB12AD88D}"/>
+                <a16:creationId xmlns:a16="http://schemas.microsoft.com/office/drawing/2014/main" xmlns="" id="{0CE015E4-3294-B668-1072-D2BAB12AD88D}"/>
               </a:ext>
             </a:extLst>
           </p:cNvPr>
@@ -1057,7 +1062,7 @@
           <p:cNvPr id="3" name="Espaço Reservado para Texto Vertical 2">
             <a:extLst>
               <a:ext uri="{FF2B5EF4-FFF2-40B4-BE49-F238E27FC236}">
-                <a16:creationId xmlns:a16="http://schemas.microsoft.com/office/drawing/2014/main" id="{097A96AF-2A76-92EF-4D81-97EA64111E66}"/>
+                <a16:creationId xmlns:a16="http://schemas.microsoft.com/office/drawing/2014/main" xmlns="" id="{097A96AF-2A76-92EF-4D81-97EA64111E66}"/>
               </a:ext>
             </a:extLst>
           </p:cNvPr>
@@ -1114,7 +1119,7 @@
           <p:cNvPr id="4" name="Espaço Reservado para Data 3">
             <a:extLst>
               <a:ext uri="{FF2B5EF4-FFF2-40B4-BE49-F238E27FC236}">
-                <a16:creationId xmlns:a16="http://schemas.microsoft.com/office/drawing/2014/main" id="{C77D10C7-CEF7-464D-4B67-8F73A02A302E}"/>
+                <a16:creationId xmlns:a16="http://schemas.microsoft.com/office/drawing/2014/main" xmlns="" id="{C77D10C7-CEF7-464D-4B67-8F73A02A302E}"/>
               </a:ext>
             </a:extLst>
           </p:cNvPr>
@@ -1132,7 +1137,7 @@
           <a:p>
             <a:fld id="{A5D21590-1B13-4BF7-9C26-3F68F7B678FF}" type="datetimeFigureOut">
               <a:rPr lang="pt-BR" smtClean="0"/>
-              <a:t>11/03/2023</a:t>
+              <a:t>14/03/2023</a:t>
             </a:fld>
             <a:endParaRPr lang="pt-BR"/>
           </a:p>
@@ -1143,7 +1148,7 @@
           <p:cNvPr id="5" name="Espaço Reservado para Rodapé 4">
             <a:extLst>
               <a:ext uri="{FF2B5EF4-FFF2-40B4-BE49-F238E27FC236}">
-                <a16:creationId xmlns:a16="http://schemas.microsoft.com/office/drawing/2014/main" id="{DF525C14-900A-EECB-A4CE-5BFC1FF2FADF}"/>
+                <a16:creationId xmlns:a16="http://schemas.microsoft.com/office/drawing/2014/main" xmlns="" id="{DF525C14-900A-EECB-A4CE-5BFC1FF2FADF}"/>
               </a:ext>
             </a:extLst>
           </p:cNvPr>
@@ -1168,7 +1173,7 @@
           <p:cNvPr id="6" name="Espaço Reservado para Número de Slide 5">
             <a:extLst>
               <a:ext uri="{FF2B5EF4-FFF2-40B4-BE49-F238E27FC236}">
-                <a16:creationId xmlns:a16="http://schemas.microsoft.com/office/drawing/2014/main" id="{F012DC79-BC1B-C935-00FC-1812DE3165BA}"/>
+                <a16:creationId xmlns:a16="http://schemas.microsoft.com/office/drawing/2014/main" xmlns="" id="{F012DC79-BC1B-C935-00FC-1812DE3165BA}"/>
               </a:ext>
             </a:extLst>
           </p:cNvPr>
@@ -1227,7 +1232,7 @@
           <p:cNvPr id="2" name="Título Vertical 1">
             <a:extLst>
               <a:ext uri="{FF2B5EF4-FFF2-40B4-BE49-F238E27FC236}">
-                <a16:creationId xmlns:a16="http://schemas.microsoft.com/office/drawing/2014/main" id="{1D5503F0-BDE5-0400-463B-CD32B424BC9E}"/>
+                <a16:creationId xmlns:a16="http://schemas.microsoft.com/office/drawing/2014/main" xmlns="" id="{1D5503F0-BDE5-0400-463B-CD32B424BC9E}"/>
               </a:ext>
             </a:extLst>
           </p:cNvPr>
@@ -1260,7 +1265,7 @@
           <p:cNvPr id="3" name="Espaço Reservado para Texto Vertical 2">
             <a:extLst>
               <a:ext uri="{FF2B5EF4-FFF2-40B4-BE49-F238E27FC236}">
-                <a16:creationId xmlns:a16="http://schemas.microsoft.com/office/drawing/2014/main" id="{AC2343A0-200C-7B7F-DA81-80B60446905A}"/>
+                <a16:creationId xmlns:a16="http://schemas.microsoft.com/office/drawing/2014/main" xmlns="" id="{AC2343A0-200C-7B7F-DA81-80B60446905A}"/>
               </a:ext>
             </a:extLst>
           </p:cNvPr>
@@ -1322,7 +1327,7 @@
           <p:cNvPr id="4" name="Espaço Reservado para Data 3">
             <a:extLst>
               <a:ext uri="{FF2B5EF4-FFF2-40B4-BE49-F238E27FC236}">
-                <a16:creationId xmlns:a16="http://schemas.microsoft.com/office/drawing/2014/main" id="{E31F7DF8-7FCF-1E6C-D23F-184AF74DE9FA}"/>
+                <a16:creationId xmlns:a16="http://schemas.microsoft.com/office/drawing/2014/main" xmlns="" id="{E31F7DF8-7FCF-1E6C-D23F-184AF74DE9FA}"/>
               </a:ext>
             </a:extLst>
           </p:cNvPr>
@@ -1340,7 +1345,7 @@
           <a:p>
             <a:fld id="{A5D21590-1B13-4BF7-9C26-3F68F7B678FF}" type="datetimeFigureOut">
               <a:rPr lang="pt-BR" smtClean="0"/>
-              <a:t>11/03/2023</a:t>
+              <a:t>14/03/2023</a:t>
             </a:fld>
             <a:endParaRPr lang="pt-BR"/>
           </a:p>
@@ -1351,7 +1356,7 @@
           <p:cNvPr id="5" name="Espaço Reservado para Rodapé 4">
             <a:extLst>
               <a:ext uri="{FF2B5EF4-FFF2-40B4-BE49-F238E27FC236}">
-                <a16:creationId xmlns:a16="http://schemas.microsoft.com/office/drawing/2014/main" id="{C614949A-9D34-ED38-6DFD-A39D73D6BB06}"/>
+                <a16:creationId xmlns:a16="http://schemas.microsoft.com/office/drawing/2014/main" xmlns="" id="{C614949A-9D34-ED38-6DFD-A39D73D6BB06}"/>
               </a:ext>
             </a:extLst>
           </p:cNvPr>
@@ -1376,7 +1381,7 @@
           <p:cNvPr id="6" name="Espaço Reservado para Número de Slide 5">
             <a:extLst>
               <a:ext uri="{FF2B5EF4-FFF2-40B4-BE49-F238E27FC236}">
-                <a16:creationId xmlns:a16="http://schemas.microsoft.com/office/drawing/2014/main" id="{E25AC377-29F3-BB76-8B56-9A6EA12EAE98}"/>
+                <a16:creationId xmlns:a16="http://schemas.microsoft.com/office/drawing/2014/main" xmlns="" id="{E25AC377-29F3-BB76-8B56-9A6EA12EAE98}"/>
               </a:ext>
             </a:extLst>
           </p:cNvPr>
@@ -1435,7 +1440,7 @@
           <p:cNvPr id="2" name="Título 1">
             <a:extLst>
               <a:ext uri="{FF2B5EF4-FFF2-40B4-BE49-F238E27FC236}">
-                <a16:creationId xmlns:a16="http://schemas.microsoft.com/office/drawing/2014/main" id="{AE036ACB-F02B-34FA-1D64-8A67348EA0C5}"/>
+                <a16:creationId xmlns:a16="http://schemas.microsoft.com/office/drawing/2014/main" xmlns="" id="{AE036ACB-F02B-34FA-1D64-8A67348EA0C5}"/>
               </a:ext>
             </a:extLst>
           </p:cNvPr>
@@ -1463,7 +1468,7 @@
           <p:cNvPr id="3" name="Espaço Reservado para Conteúdo 2">
             <a:extLst>
               <a:ext uri="{FF2B5EF4-FFF2-40B4-BE49-F238E27FC236}">
-                <a16:creationId xmlns:a16="http://schemas.microsoft.com/office/drawing/2014/main" id="{D9CDDB1C-9EDD-64A0-370B-D3F70385D1D4}"/>
+                <a16:creationId xmlns:a16="http://schemas.microsoft.com/office/drawing/2014/main" xmlns="" id="{D9CDDB1C-9EDD-64A0-370B-D3F70385D1D4}"/>
               </a:ext>
             </a:extLst>
           </p:cNvPr>
@@ -1520,7 +1525,7 @@
           <p:cNvPr id="4" name="Espaço Reservado para Data 3">
             <a:extLst>
               <a:ext uri="{FF2B5EF4-FFF2-40B4-BE49-F238E27FC236}">
-                <a16:creationId xmlns:a16="http://schemas.microsoft.com/office/drawing/2014/main" id="{78ABB235-A384-14FD-31C3-2B9E21FBDC98}"/>
+                <a16:creationId xmlns:a16="http://schemas.microsoft.com/office/drawing/2014/main" xmlns="" id="{78ABB235-A384-14FD-31C3-2B9E21FBDC98}"/>
               </a:ext>
             </a:extLst>
           </p:cNvPr>
@@ -1538,7 +1543,7 @@
           <a:p>
             <a:fld id="{A5D21590-1B13-4BF7-9C26-3F68F7B678FF}" type="datetimeFigureOut">
               <a:rPr lang="pt-BR" smtClean="0"/>
-              <a:t>11/03/2023</a:t>
+              <a:t>14/03/2023</a:t>
             </a:fld>
             <a:endParaRPr lang="pt-BR"/>
           </a:p>
@@ -1549,7 +1554,7 @@
           <p:cNvPr id="5" name="Espaço Reservado para Rodapé 4">
             <a:extLst>
               <a:ext uri="{FF2B5EF4-FFF2-40B4-BE49-F238E27FC236}">
-                <a16:creationId xmlns:a16="http://schemas.microsoft.com/office/drawing/2014/main" id="{7DAC41A7-9BF0-CA90-56CD-030954582AFA}"/>
+                <a16:creationId xmlns:a16="http://schemas.microsoft.com/office/drawing/2014/main" xmlns="" id="{7DAC41A7-9BF0-CA90-56CD-030954582AFA}"/>
               </a:ext>
             </a:extLst>
           </p:cNvPr>
@@ -1574,7 +1579,7 @@
           <p:cNvPr id="6" name="Espaço Reservado para Número de Slide 5">
             <a:extLst>
               <a:ext uri="{FF2B5EF4-FFF2-40B4-BE49-F238E27FC236}">
-                <a16:creationId xmlns:a16="http://schemas.microsoft.com/office/drawing/2014/main" id="{0D13D687-AB89-E2E0-B108-9E1D09F41DC7}"/>
+                <a16:creationId xmlns:a16="http://schemas.microsoft.com/office/drawing/2014/main" xmlns="" id="{0D13D687-AB89-E2E0-B108-9E1D09F41DC7}"/>
               </a:ext>
             </a:extLst>
           </p:cNvPr>
@@ -1633,7 +1638,7 @@
           <p:cNvPr id="2" name="Título 1">
             <a:extLst>
               <a:ext uri="{FF2B5EF4-FFF2-40B4-BE49-F238E27FC236}">
-                <a16:creationId xmlns:a16="http://schemas.microsoft.com/office/drawing/2014/main" id="{9170A01D-345E-2469-9208-B1505F063462}"/>
+                <a16:creationId xmlns:a16="http://schemas.microsoft.com/office/drawing/2014/main" xmlns="" id="{9170A01D-345E-2469-9208-B1505F063462}"/>
               </a:ext>
             </a:extLst>
           </p:cNvPr>
@@ -1670,7 +1675,7 @@
           <p:cNvPr id="3" name="Espaço Reservado para Texto 2">
             <a:extLst>
               <a:ext uri="{FF2B5EF4-FFF2-40B4-BE49-F238E27FC236}">
-                <a16:creationId xmlns:a16="http://schemas.microsoft.com/office/drawing/2014/main" id="{39C5EF7A-124E-C262-6C3F-C997DE1A928C}"/>
+                <a16:creationId xmlns:a16="http://schemas.microsoft.com/office/drawing/2014/main" xmlns="" id="{39C5EF7A-124E-C262-6C3F-C997DE1A928C}"/>
               </a:ext>
             </a:extLst>
           </p:cNvPr>
@@ -1795,7 +1800,7 @@
           <p:cNvPr id="4" name="Espaço Reservado para Data 3">
             <a:extLst>
               <a:ext uri="{FF2B5EF4-FFF2-40B4-BE49-F238E27FC236}">
-                <a16:creationId xmlns:a16="http://schemas.microsoft.com/office/drawing/2014/main" id="{64D1B1A1-6CAB-49A1-7B71-A86E6E684B6E}"/>
+                <a16:creationId xmlns:a16="http://schemas.microsoft.com/office/drawing/2014/main" xmlns="" id="{64D1B1A1-6CAB-49A1-7B71-A86E6E684B6E}"/>
               </a:ext>
             </a:extLst>
           </p:cNvPr>
@@ -1813,7 +1818,7 @@
           <a:p>
             <a:fld id="{A5D21590-1B13-4BF7-9C26-3F68F7B678FF}" type="datetimeFigureOut">
               <a:rPr lang="pt-BR" smtClean="0"/>
-              <a:t>11/03/2023</a:t>
+              <a:t>14/03/2023</a:t>
             </a:fld>
             <a:endParaRPr lang="pt-BR"/>
           </a:p>
@@ -1824,7 +1829,7 @@
           <p:cNvPr id="5" name="Espaço Reservado para Rodapé 4">
             <a:extLst>
               <a:ext uri="{FF2B5EF4-FFF2-40B4-BE49-F238E27FC236}">
-                <a16:creationId xmlns:a16="http://schemas.microsoft.com/office/drawing/2014/main" id="{20148668-E7E9-72EE-2D96-0EF71178BC04}"/>
+                <a16:creationId xmlns:a16="http://schemas.microsoft.com/office/drawing/2014/main" xmlns="" id="{20148668-E7E9-72EE-2D96-0EF71178BC04}"/>
               </a:ext>
             </a:extLst>
           </p:cNvPr>
@@ -1849,7 +1854,7 @@
           <p:cNvPr id="6" name="Espaço Reservado para Número de Slide 5">
             <a:extLst>
               <a:ext uri="{FF2B5EF4-FFF2-40B4-BE49-F238E27FC236}">
-                <a16:creationId xmlns:a16="http://schemas.microsoft.com/office/drawing/2014/main" id="{F1E31206-A81E-590D-25F7-EFEBEA06DDE7}"/>
+                <a16:creationId xmlns:a16="http://schemas.microsoft.com/office/drawing/2014/main" xmlns="" id="{F1E31206-A81E-590D-25F7-EFEBEA06DDE7}"/>
               </a:ext>
             </a:extLst>
           </p:cNvPr>
@@ -1908,7 +1913,7 @@
           <p:cNvPr id="2" name="Título 1">
             <a:extLst>
               <a:ext uri="{FF2B5EF4-FFF2-40B4-BE49-F238E27FC236}">
-                <a16:creationId xmlns:a16="http://schemas.microsoft.com/office/drawing/2014/main" id="{8FEB764A-34A8-2A6A-7EDF-4BF132DB4F0F}"/>
+                <a16:creationId xmlns:a16="http://schemas.microsoft.com/office/drawing/2014/main" xmlns="" id="{8FEB764A-34A8-2A6A-7EDF-4BF132DB4F0F}"/>
               </a:ext>
             </a:extLst>
           </p:cNvPr>
@@ -1936,7 +1941,7 @@
           <p:cNvPr id="3" name="Espaço Reservado para Conteúdo 2">
             <a:extLst>
               <a:ext uri="{FF2B5EF4-FFF2-40B4-BE49-F238E27FC236}">
-                <a16:creationId xmlns:a16="http://schemas.microsoft.com/office/drawing/2014/main" id="{0BE4247D-032F-ECDA-55A6-24F8398330B3}"/>
+                <a16:creationId xmlns:a16="http://schemas.microsoft.com/office/drawing/2014/main" xmlns="" id="{0BE4247D-032F-ECDA-55A6-24F8398330B3}"/>
               </a:ext>
             </a:extLst>
           </p:cNvPr>
@@ -1998,7 +2003,7 @@
           <p:cNvPr id="4" name="Espaço Reservado para Conteúdo 3">
             <a:extLst>
               <a:ext uri="{FF2B5EF4-FFF2-40B4-BE49-F238E27FC236}">
-                <a16:creationId xmlns:a16="http://schemas.microsoft.com/office/drawing/2014/main" id="{8F9E038B-9AE1-0830-0584-3FE505F858C8}"/>
+                <a16:creationId xmlns:a16="http://schemas.microsoft.com/office/drawing/2014/main" xmlns="" id="{8F9E038B-9AE1-0830-0584-3FE505F858C8}"/>
               </a:ext>
             </a:extLst>
           </p:cNvPr>
@@ -2060,7 +2065,7 @@
           <p:cNvPr id="5" name="Espaço Reservado para Data 4">
             <a:extLst>
               <a:ext uri="{FF2B5EF4-FFF2-40B4-BE49-F238E27FC236}">
-                <a16:creationId xmlns:a16="http://schemas.microsoft.com/office/drawing/2014/main" id="{15DD4B17-E69F-BE65-6C15-087E94C8F63D}"/>
+                <a16:creationId xmlns:a16="http://schemas.microsoft.com/office/drawing/2014/main" xmlns="" id="{15DD4B17-E69F-BE65-6C15-087E94C8F63D}"/>
               </a:ext>
             </a:extLst>
           </p:cNvPr>
@@ -2078,7 +2083,7 @@
           <a:p>
             <a:fld id="{A5D21590-1B13-4BF7-9C26-3F68F7B678FF}" type="datetimeFigureOut">
               <a:rPr lang="pt-BR" smtClean="0"/>
-              <a:t>11/03/2023</a:t>
+              <a:t>14/03/2023</a:t>
             </a:fld>
             <a:endParaRPr lang="pt-BR"/>
           </a:p>
@@ -2089,7 +2094,7 @@
           <p:cNvPr id="6" name="Espaço Reservado para Rodapé 5">
             <a:extLst>
               <a:ext uri="{FF2B5EF4-FFF2-40B4-BE49-F238E27FC236}">
-                <a16:creationId xmlns:a16="http://schemas.microsoft.com/office/drawing/2014/main" id="{D0178AD6-3079-AB8A-62E5-6541C6FD5E68}"/>
+                <a16:creationId xmlns:a16="http://schemas.microsoft.com/office/drawing/2014/main" xmlns="" id="{D0178AD6-3079-AB8A-62E5-6541C6FD5E68}"/>
               </a:ext>
             </a:extLst>
           </p:cNvPr>
@@ -2114,7 +2119,7 @@
           <p:cNvPr id="7" name="Espaço Reservado para Número de Slide 6">
             <a:extLst>
               <a:ext uri="{FF2B5EF4-FFF2-40B4-BE49-F238E27FC236}">
-                <a16:creationId xmlns:a16="http://schemas.microsoft.com/office/drawing/2014/main" id="{17357E98-2650-CA2F-51D0-F09C19D35351}"/>
+                <a16:creationId xmlns:a16="http://schemas.microsoft.com/office/drawing/2014/main" xmlns="" id="{17357E98-2650-CA2F-51D0-F09C19D35351}"/>
               </a:ext>
             </a:extLst>
           </p:cNvPr>
@@ -2173,7 +2178,7 @@
           <p:cNvPr id="2" name="Título 1">
             <a:extLst>
               <a:ext uri="{FF2B5EF4-FFF2-40B4-BE49-F238E27FC236}">
-                <a16:creationId xmlns:a16="http://schemas.microsoft.com/office/drawing/2014/main" id="{3B4CEE3F-3FBC-8D70-6EA9-CB2D443CDEFA}"/>
+                <a16:creationId xmlns:a16="http://schemas.microsoft.com/office/drawing/2014/main" xmlns="" id="{3B4CEE3F-3FBC-8D70-6EA9-CB2D443CDEFA}"/>
               </a:ext>
             </a:extLst>
           </p:cNvPr>
@@ -2206,7 +2211,7 @@
           <p:cNvPr id="3" name="Espaço Reservado para Texto 2">
             <a:extLst>
               <a:ext uri="{FF2B5EF4-FFF2-40B4-BE49-F238E27FC236}">
-                <a16:creationId xmlns:a16="http://schemas.microsoft.com/office/drawing/2014/main" id="{340A4408-1EE9-AA7F-DD18-A312239DDB99}"/>
+                <a16:creationId xmlns:a16="http://schemas.microsoft.com/office/drawing/2014/main" xmlns="" id="{340A4408-1EE9-AA7F-DD18-A312239DDB99}"/>
               </a:ext>
             </a:extLst>
           </p:cNvPr>
@@ -2277,7 +2282,7 @@
           <p:cNvPr id="4" name="Espaço Reservado para Conteúdo 3">
             <a:extLst>
               <a:ext uri="{FF2B5EF4-FFF2-40B4-BE49-F238E27FC236}">
-                <a16:creationId xmlns:a16="http://schemas.microsoft.com/office/drawing/2014/main" id="{485FBC4B-FBBD-1B20-B188-CD9256107A8F}"/>
+                <a16:creationId xmlns:a16="http://schemas.microsoft.com/office/drawing/2014/main" xmlns="" id="{485FBC4B-FBBD-1B20-B188-CD9256107A8F}"/>
               </a:ext>
             </a:extLst>
           </p:cNvPr>
@@ -2339,7 +2344,7 @@
           <p:cNvPr id="5" name="Espaço Reservado para Texto 4">
             <a:extLst>
               <a:ext uri="{FF2B5EF4-FFF2-40B4-BE49-F238E27FC236}">
-                <a16:creationId xmlns:a16="http://schemas.microsoft.com/office/drawing/2014/main" id="{4630AD89-A12F-BD8F-8623-FB66EDCFE56E}"/>
+                <a16:creationId xmlns:a16="http://schemas.microsoft.com/office/drawing/2014/main" xmlns="" id="{4630AD89-A12F-BD8F-8623-FB66EDCFE56E}"/>
               </a:ext>
             </a:extLst>
           </p:cNvPr>
@@ -2410,7 +2415,7 @@
           <p:cNvPr id="6" name="Espaço Reservado para Conteúdo 5">
             <a:extLst>
               <a:ext uri="{FF2B5EF4-FFF2-40B4-BE49-F238E27FC236}">
-                <a16:creationId xmlns:a16="http://schemas.microsoft.com/office/drawing/2014/main" id="{13E17683-863E-B1D5-9ECE-881DAD0EB709}"/>
+                <a16:creationId xmlns:a16="http://schemas.microsoft.com/office/drawing/2014/main" xmlns="" id="{13E17683-863E-B1D5-9ECE-881DAD0EB709}"/>
               </a:ext>
             </a:extLst>
           </p:cNvPr>
@@ -2472,7 +2477,7 @@
           <p:cNvPr id="7" name="Espaço Reservado para Data 6">
             <a:extLst>
               <a:ext uri="{FF2B5EF4-FFF2-40B4-BE49-F238E27FC236}">
-                <a16:creationId xmlns:a16="http://schemas.microsoft.com/office/drawing/2014/main" id="{D89472A9-40BA-AFA5-3446-BA672C02CEA4}"/>
+                <a16:creationId xmlns:a16="http://schemas.microsoft.com/office/drawing/2014/main" xmlns="" id="{D89472A9-40BA-AFA5-3446-BA672C02CEA4}"/>
               </a:ext>
             </a:extLst>
           </p:cNvPr>
@@ -2490,7 +2495,7 @@
           <a:p>
             <a:fld id="{A5D21590-1B13-4BF7-9C26-3F68F7B678FF}" type="datetimeFigureOut">
               <a:rPr lang="pt-BR" smtClean="0"/>
-              <a:t>11/03/2023</a:t>
+              <a:t>14/03/2023</a:t>
             </a:fld>
             <a:endParaRPr lang="pt-BR"/>
           </a:p>
@@ -2501,7 +2506,7 @@
           <p:cNvPr id="8" name="Espaço Reservado para Rodapé 7">
             <a:extLst>
               <a:ext uri="{FF2B5EF4-FFF2-40B4-BE49-F238E27FC236}">
-                <a16:creationId xmlns:a16="http://schemas.microsoft.com/office/drawing/2014/main" id="{3DA9A3AD-777B-BFB1-B20E-A7910D188422}"/>
+                <a16:creationId xmlns:a16="http://schemas.microsoft.com/office/drawing/2014/main" xmlns="" id="{3DA9A3AD-777B-BFB1-B20E-A7910D188422}"/>
               </a:ext>
             </a:extLst>
           </p:cNvPr>
@@ -2526,7 +2531,7 @@
           <p:cNvPr id="9" name="Espaço Reservado para Número de Slide 8">
             <a:extLst>
               <a:ext uri="{FF2B5EF4-FFF2-40B4-BE49-F238E27FC236}">
-                <a16:creationId xmlns:a16="http://schemas.microsoft.com/office/drawing/2014/main" id="{9DD9619A-A03F-9F7A-E726-D9912A03F6C2}"/>
+                <a16:creationId xmlns:a16="http://schemas.microsoft.com/office/drawing/2014/main" xmlns="" id="{9DD9619A-A03F-9F7A-E726-D9912A03F6C2}"/>
               </a:ext>
             </a:extLst>
           </p:cNvPr>
@@ -2585,7 +2590,7 @@
           <p:cNvPr id="2" name="Título 1">
             <a:extLst>
               <a:ext uri="{FF2B5EF4-FFF2-40B4-BE49-F238E27FC236}">
-                <a16:creationId xmlns:a16="http://schemas.microsoft.com/office/drawing/2014/main" id="{D7A40131-4033-39CB-6379-53CAB56F80A4}"/>
+                <a16:creationId xmlns:a16="http://schemas.microsoft.com/office/drawing/2014/main" xmlns="" id="{D7A40131-4033-39CB-6379-53CAB56F80A4}"/>
               </a:ext>
             </a:extLst>
           </p:cNvPr>
@@ -2613,7 +2618,7 @@
           <p:cNvPr id="3" name="Espaço Reservado para Data 2">
             <a:extLst>
               <a:ext uri="{FF2B5EF4-FFF2-40B4-BE49-F238E27FC236}">
-                <a16:creationId xmlns:a16="http://schemas.microsoft.com/office/drawing/2014/main" id="{8DC57CA3-C174-66E3-B109-22D3EFC9B058}"/>
+                <a16:creationId xmlns:a16="http://schemas.microsoft.com/office/drawing/2014/main" xmlns="" id="{8DC57CA3-C174-66E3-B109-22D3EFC9B058}"/>
               </a:ext>
             </a:extLst>
           </p:cNvPr>
@@ -2631,7 +2636,7 @@
           <a:p>
             <a:fld id="{A5D21590-1B13-4BF7-9C26-3F68F7B678FF}" type="datetimeFigureOut">
               <a:rPr lang="pt-BR" smtClean="0"/>
-              <a:t>11/03/2023</a:t>
+              <a:t>14/03/2023</a:t>
             </a:fld>
             <a:endParaRPr lang="pt-BR"/>
           </a:p>
@@ -2642,7 +2647,7 @@
           <p:cNvPr id="4" name="Espaço Reservado para Rodapé 3">
             <a:extLst>
               <a:ext uri="{FF2B5EF4-FFF2-40B4-BE49-F238E27FC236}">
-                <a16:creationId xmlns:a16="http://schemas.microsoft.com/office/drawing/2014/main" id="{B7F7EDAF-B28E-603A-9A9E-C77A8DD5285C}"/>
+                <a16:creationId xmlns:a16="http://schemas.microsoft.com/office/drawing/2014/main" xmlns="" id="{B7F7EDAF-B28E-603A-9A9E-C77A8DD5285C}"/>
               </a:ext>
             </a:extLst>
           </p:cNvPr>
@@ -2667,7 +2672,7 @@
           <p:cNvPr id="5" name="Espaço Reservado para Número de Slide 4">
             <a:extLst>
               <a:ext uri="{FF2B5EF4-FFF2-40B4-BE49-F238E27FC236}">
-                <a16:creationId xmlns:a16="http://schemas.microsoft.com/office/drawing/2014/main" id="{B31440B6-B055-93C5-E707-5314EFEC4AD4}"/>
+                <a16:creationId xmlns:a16="http://schemas.microsoft.com/office/drawing/2014/main" xmlns="" id="{B31440B6-B055-93C5-E707-5314EFEC4AD4}"/>
               </a:ext>
             </a:extLst>
           </p:cNvPr>
@@ -2726,7 +2731,7 @@
           <p:cNvPr id="2" name="Espaço Reservado para Data 1">
             <a:extLst>
               <a:ext uri="{FF2B5EF4-FFF2-40B4-BE49-F238E27FC236}">
-                <a16:creationId xmlns:a16="http://schemas.microsoft.com/office/drawing/2014/main" id="{C31DF2C0-8C26-6BD0-FBFC-245A7772C00E}"/>
+                <a16:creationId xmlns:a16="http://schemas.microsoft.com/office/drawing/2014/main" xmlns="" id="{C31DF2C0-8C26-6BD0-FBFC-245A7772C00E}"/>
               </a:ext>
             </a:extLst>
           </p:cNvPr>
@@ -2744,7 +2749,7 @@
           <a:p>
             <a:fld id="{A5D21590-1B13-4BF7-9C26-3F68F7B678FF}" type="datetimeFigureOut">
               <a:rPr lang="pt-BR" smtClean="0"/>
-              <a:t>11/03/2023</a:t>
+              <a:t>14/03/2023</a:t>
             </a:fld>
             <a:endParaRPr lang="pt-BR"/>
           </a:p>
@@ -2755,7 +2760,7 @@
           <p:cNvPr id="3" name="Espaço Reservado para Rodapé 2">
             <a:extLst>
               <a:ext uri="{FF2B5EF4-FFF2-40B4-BE49-F238E27FC236}">
-                <a16:creationId xmlns:a16="http://schemas.microsoft.com/office/drawing/2014/main" id="{1F0AAA05-D59D-CA98-87DA-5830576F57DE}"/>
+                <a16:creationId xmlns:a16="http://schemas.microsoft.com/office/drawing/2014/main" xmlns="" id="{1F0AAA05-D59D-CA98-87DA-5830576F57DE}"/>
               </a:ext>
             </a:extLst>
           </p:cNvPr>
@@ -2780,7 +2785,7 @@
           <p:cNvPr id="4" name="Espaço Reservado para Número de Slide 3">
             <a:extLst>
               <a:ext uri="{FF2B5EF4-FFF2-40B4-BE49-F238E27FC236}">
-                <a16:creationId xmlns:a16="http://schemas.microsoft.com/office/drawing/2014/main" id="{F1DE4E6D-7E69-F348-8EAD-4D93573A3BBE}"/>
+                <a16:creationId xmlns:a16="http://schemas.microsoft.com/office/drawing/2014/main" xmlns="" id="{F1DE4E6D-7E69-F348-8EAD-4D93573A3BBE}"/>
               </a:ext>
             </a:extLst>
           </p:cNvPr>
@@ -2839,7 +2844,7 @@
           <p:cNvPr id="2" name="Título 1">
             <a:extLst>
               <a:ext uri="{FF2B5EF4-FFF2-40B4-BE49-F238E27FC236}">
-                <a16:creationId xmlns:a16="http://schemas.microsoft.com/office/drawing/2014/main" id="{E891ACAF-C117-2EC7-E370-7FEA67598A19}"/>
+                <a16:creationId xmlns:a16="http://schemas.microsoft.com/office/drawing/2014/main" xmlns="" id="{E891ACAF-C117-2EC7-E370-7FEA67598A19}"/>
               </a:ext>
             </a:extLst>
           </p:cNvPr>
@@ -2876,7 +2881,7 @@
           <p:cNvPr id="3" name="Espaço Reservado para Conteúdo 2">
             <a:extLst>
               <a:ext uri="{FF2B5EF4-FFF2-40B4-BE49-F238E27FC236}">
-                <a16:creationId xmlns:a16="http://schemas.microsoft.com/office/drawing/2014/main" id="{15BD0D04-1004-1208-8BD0-118CF1D1014F}"/>
+                <a16:creationId xmlns:a16="http://schemas.microsoft.com/office/drawing/2014/main" xmlns="" id="{15BD0D04-1004-1208-8BD0-118CF1D1014F}"/>
               </a:ext>
             </a:extLst>
           </p:cNvPr>
@@ -2966,7 +2971,7 @@
           <p:cNvPr id="4" name="Espaço Reservado para Texto 3">
             <a:extLst>
               <a:ext uri="{FF2B5EF4-FFF2-40B4-BE49-F238E27FC236}">
-                <a16:creationId xmlns:a16="http://schemas.microsoft.com/office/drawing/2014/main" id="{2B0A2432-09E7-D87B-5B10-1C776F30B350}"/>
+                <a16:creationId xmlns:a16="http://schemas.microsoft.com/office/drawing/2014/main" xmlns="" id="{2B0A2432-09E7-D87B-5B10-1C776F30B350}"/>
               </a:ext>
             </a:extLst>
           </p:cNvPr>
@@ -3037,7 +3042,7 @@
           <p:cNvPr id="5" name="Espaço Reservado para Data 4">
             <a:extLst>
               <a:ext uri="{FF2B5EF4-FFF2-40B4-BE49-F238E27FC236}">
-                <a16:creationId xmlns:a16="http://schemas.microsoft.com/office/drawing/2014/main" id="{B689C601-205C-E885-2B6E-7487B649260E}"/>
+                <a16:creationId xmlns:a16="http://schemas.microsoft.com/office/drawing/2014/main" xmlns="" id="{B689C601-205C-E885-2B6E-7487B649260E}"/>
               </a:ext>
             </a:extLst>
           </p:cNvPr>
@@ -3055,7 +3060,7 @@
           <a:p>
             <a:fld id="{A5D21590-1B13-4BF7-9C26-3F68F7B678FF}" type="datetimeFigureOut">
               <a:rPr lang="pt-BR" smtClean="0"/>
-              <a:t>11/03/2023</a:t>
+              <a:t>14/03/2023</a:t>
             </a:fld>
             <a:endParaRPr lang="pt-BR"/>
           </a:p>
@@ -3066,7 +3071,7 @@
           <p:cNvPr id="6" name="Espaço Reservado para Rodapé 5">
             <a:extLst>
               <a:ext uri="{FF2B5EF4-FFF2-40B4-BE49-F238E27FC236}">
-                <a16:creationId xmlns:a16="http://schemas.microsoft.com/office/drawing/2014/main" id="{155677B8-D20E-36B4-1064-FCEB640780BD}"/>
+                <a16:creationId xmlns:a16="http://schemas.microsoft.com/office/drawing/2014/main" xmlns="" id="{155677B8-D20E-36B4-1064-FCEB640780BD}"/>
               </a:ext>
             </a:extLst>
           </p:cNvPr>
@@ -3091,7 +3096,7 @@
           <p:cNvPr id="7" name="Espaço Reservado para Número de Slide 6">
             <a:extLst>
               <a:ext uri="{FF2B5EF4-FFF2-40B4-BE49-F238E27FC236}">
-                <a16:creationId xmlns:a16="http://schemas.microsoft.com/office/drawing/2014/main" id="{98371317-6441-6670-DCEB-DE1CB64018DD}"/>
+                <a16:creationId xmlns:a16="http://schemas.microsoft.com/office/drawing/2014/main" xmlns="" id="{98371317-6441-6670-DCEB-DE1CB64018DD}"/>
               </a:ext>
             </a:extLst>
           </p:cNvPr>
@@ -3150,7 +3155,7 @@
           <p:cNvPr id="2" name="Título 1">
             <a:extLst>
               <a:ext uri="{FF2B5EF4-FFF2-40B4-BE49-F238E27FC236}">
-                <a16:creationId xmlns:a16="http://schemas.microsoft.com/office/drawing/2014/main" id="{10009F9D-FA11-C47A-2ECB-6D66DE0D660B}"/>
+                <a16:creationId xmlns:a16="http://schemas.microsoft.com/office/drawing/2014/main" xmlns="" id="{10009F9D-FA11-C47A-2ECB-6D66DE0D660B}"/>
               </a:ext>
             </a:extLst>
           </p:cNvPr>
@@ -3187,7 +3192,7 @@
           <p:cNvPr id="3" name="Espaço Reservado para Imagem 2">
             <a:extLst>
               <a:ext uri="{FF2B5EF4-FFF2-40B4-BE49-F238E27FC236}">
-                <a16:creationId xmlns:a16="http://schemas.microsoft.com/office/drawing/2014/main" id="{7CDDDCC3-120D-874D-C190-1FF6B1A478B2}"/>
+                <a16:creationId xmlns:a16="http://schemas.microsoft.com/office/drawing/2014/main" xmlns="" id="{7CDDDCC3-120D-874D-C190-1FF6B1A478B2}"/>
               </a:ext>
             </a:extLst>
           </p:cNvPr>
@@ -3254,7 +3259,7 @@
           <p:cNvPr id="4" name="Espaço Reservado para Texto 3">
             <a:extLst>
               <a:ext uri="{FF2B5EF4-FFF2-40B4-BE49-F238E27FC236}">
-                <a16:creationId xmlns:a16="http://schemas.microsoft.com/office/drawing/2014/main" id="{E21B6D93-D74D-2552-E725-A614D419A9C0}"/>
+                <a16:creationId xmlns:a16="http://schemas.microsoft.com/office/drawing/2014/main" xmlns="" id="{E21B6D93-D74D-2552-E725-A614D419A9C0}"/>
               </a:ext>
             </a:extLst>
           </p:cNvPr>
@@ -3325,7 +3330,7 @@
           <p:cNvPr id="5" name="Espaço Reservado para Data 4">
             <a:extLst>
               <a:ext uri="{FF2B5EF4-FFF2-40B4-BE49-F238E27FC236}">
-                <a16:creationId xmlns:a16="http://schemas.microsoft.com/office/drawing/2014/main" id="{73A5BA7F-A8DC-2C46-A4A5-96FD7A25EE92}"/>
+                <a16:creationId xmlns:a16="http://schemas.microsoft.com/office/drawing/2014/main" xmlns="" id="{73A5BA7F-A8DC-2C46-A4A5-96FD7A25EE92}"/>
               </a:ext>
             </a:extLst>
           </p:cNvPr>
@@ -3343,7 +3348,7 @@
           <a:p>
             <a:fld id="{A5D21590-1B13-4BF7-9C26-3F68F7B678FF}" type="datetimeFigureOut">
               <a:rPr lang="pt-BR" smtClean="0"/>
-              <a:t>11/03/2023</a:t>
+              <a:t>14/03/2023</a:t>
             </a:fld>
             <a:endParaRPr lang="pt-BR"/>
           </a:p>
@@ -3354,7 +3359,7 @@
           <p:cNvPr id="6" name="Espaço Reservado para Rodapé 5">
             <a:extLst>
               <a:ext uri="{FF2B5EF4-FFF2-40B4-BE49-F238E27FC236}">
-                <a16:creationId xmlns:a16="http://schemas.microsoft.com/office/drawing/2014/main" id="{88B5F425-4728-DDFE-D85D-E354EB36D68B}"/>
+                <a16:creationId xmlns:a16="http://schemas.microsoft.com/office/drawing/2014/main" xmlns="" id="{88B5F425-4728-DDFE-D85D-E354EB36D68B}"/>
               </a:ext>
             </a:extLst>
           </p:cNvPr>
@@ -3379,7 +3384,7 @@
           <p:cNvPr id="7" name="Espaço Reservado para Número de Slide 6">
             <a:extLst>
               <a:ext uri="{FF2B5EF4-FFF2-40B4-BE49-F238E27FC236}">
-                <a16:creationId xmlns:a16="http://schemas.microsoft.com/office/drawing/2014/main" id="{120A65AD-8699-5500-7306-24B4E0993B68}"/>
+                <a16:creationId xmlns:a16="http://schemas.microsoft.com/office/drawing/2014/main" xmlns="" id="{120A65AD-8699-5500-7306-24B4E0993B68}"/>
               </a:ext>
             </a:extLst>
           </p:cNvPr>
@@ -3443,7 +3448,7 @@
           <p:cNvPr id="2" name="Espaço Reservado para Título 1">
             <a:extLst>
               <a:ext uri="{FF2B5EF4-FFF2-40B4-BE49-F238E27FC236}">
-                <a16:creationId xmlns:a16="http://schemas.microsoft.com/office/drawing/2014/main" id="{E416F7A0-836B-DB7F-F520-9344C8E5C806}"/>
+                <a16:creationId xmlns:a16="http://schemas.microsoft.com/office/drawing/2014/main" xmlns="" id="{E416F7A0-836B-DB7F-F520-9344C8E5C806}"/>
               </a:ext>
             </a:extLst>
           </p:cNvPr>
@@ -3481,7 +3486,7 @@
           <p:cNvPr id="3" name="Espaço Reservado para Texto 2">
             <a:extLst>
               <a:ext uri="{FF2B5EF4-FFF2-40B4-BE49-F238E27FC236}">
-                <a16:creationId xmlns:a16="http://schemas.microsoft.com/office/drawing/2014/main" id="{212F285F-05C5-78C3-4A8A-CD1F9FAEBA63}"/>
+                <a16:creationId xmlns:a16="http://schemas.microsoft.com/office/drawing/2014/main" xmlns="" id="{212F285F-05C5-78C3-4A8A-CD1F9FAEBA63}"/>
               </a:ext>
             </a:extLst>
           </p:cNvPr>
@@ -3548,7 +3553,7 @@
           <p:cNvPr id="4" name="Espaço Reservado para Data 3">
             <a:extLst>
               <a:ext uri="{FF2B5EF4-FFF2-40B4-BE49-F238E27FC236}">
-                <a16:creationId xmlns:a16="http://schemas.microsoft.com/office/drawing/2014/main" id="{668B472A-5368-F69E-1054-214D52BB4E21}"/>
+                <a16:creationId xmlns:a16="http://schemas.microsoft.com/office/drawing/2014/main" xmlns="" id="{668B472A-5368-F69E-1054-214D52BB4E21}"/>
               </a:ext>
             </a:extLst>
           </p:cNvPr>
@@ -3584,7 +3589,7 @@
           <a:p>
             <a:fld id="{A5D21590-1B13-4BF7-9C26-3F68F7B678FF}" type="datetimeFigureOut">
               <a:rPr lang="pt-BR" smtClean="0"/>
-              <a:t>11/03/2023</a:t>
+              <a:t>14/03/2023</a:t>
             </a:fld>
             <a:endParaRPr lang="pt-BR"/>
           </a:p>
@@ -3595,7 +3600,7 @@
           <p:cNvPr id="5" name="Espaço Reservado para Rodapé 4">
             <a:extLst>
               <a:ext uri="{FF2B5EF4-FFF2-40B4-BE49-F238E27FC236}">
-                <a16:creationId xmlns:a16="http://schemas.microsoft.com/office/drawing/2014/main" id="{2A7750C5-198C-5059-1A8C-F23C283687A9}"/>
+                <a16:creationId xmlns:a16="http://schemas.microsoft.com/office/drawing/2014/main" xmlns="" id="{2A7750C5-198C-5059-1A8C-F23C283687A9}"/>
               </a:ext>
             </a:extLst>
           </p:cNvPr>
@@ -3638,7 +3643,7 @@
           <p:cNvPr id="6" name="Espaço Reservado para Número de Slide 5">
             <a:extLst>
               <a:ext uri="{FF2B5EF4-FFF2-40B4-BE49-F238E27FC236}">
-                <a16:creationId xmlns:a16="http://schemas.microsoft.com/office/drawing/2014/main" id="{6036A69D-F76C-1AB2-D584-54B9C4698221}"/>
+                <a16:creationId xmlns:a16="http://schemas.microsoft.com/office/drawing/2014/main" xmlns="" id="{6036A69D-F76C-1AB2-D584-54B9C4698221}"/>
               </a:ext>
             </a:extLst>
           </p:cNvPr>
@@ -4006,7 +4011,7 @@
           <p:cNvPr id="3" name="Subtítulo 2">
             <a:extLst>
               <a:ext uri="{FF2B5EF4-FFF2-40B4-BE49-F238E27FC236}">
-                <a16:creationId xmlns:a16="http://schemas.microsoft.com/office/drawing/2014/main" id="{A27794FD-FEA3-F1FB-1E32-03387D958899}"/>
+                <a16:creationId xmlns:a16="http://schemas.microsoft.com/office/drawing/2014/main" xmlns="" id="{A27794FD-FEA3-F1FB-1E32-03387D958899}"/>
               </a:ext>
             </a:extLst>
           </p:cNvPr>
@@ -4100,7 +4105,7 @@
           <p:cNvPr id="5" name="Imagem 4" descr="Faculdade de Tecnologia do Estado de São Paulo – Wikipédia ...">
             <a:extLst>
               <a:ext uri="{FF2B5EF4-FFF2-40B4-BE49-F238E27FC236}">
-                <a16:creationId xmlns:a16="http://schemas.microsoft.com/office/drawing/2014/main" id="{84F4224E-5C4F-0959-E344-3C62F7D15871}"/>
+                <a16:creationId xmlns:a16="http://schemas.microsoft.com/office/drawing/2014/main" xmlns="" id="{84F4224E-5C4F-0959-E344-3C62F7D15871}"/>
               </a:ext>
             </a:extLst>
           </p:cNvPr>
@@ -4171,7 +4176,7 @@
           <p:cNvPr id="3" name="Espaço Reservado para Conteúdo 2">
             <a:extLst>
               <a:ext uri="{FF2B5EF4-FFF2-40B4-BE49-F238E27FC236}">
-                <a16:creationId xmlns:a16="http://schemas.microsoft.com/office/drawing/2014/main" id="{E64D6D75-C1E5-3FFC-BD7C-AE5D84F73826}"/>
+                <a16:creationId xmlns:a16="http://schemas.microsoft.com/office/drawing/2014/main" xmlns="" id="{E64D6D75-C1E5-3FFC-BD7C-AE5D84F73826}"/>
               </a:ext>
             </a:extLst>
           </p:cNvPr>
@@ -4344,7 +4349,7 @@
           <p:cNvPr id="2" name="Título 1">
             <a:extLst>
               <a:ext uri="{FF2B5EF4-FFF2-40B4-BE49-F238E27FC236}">
-                <a16:creationId xmlns:a16="http://schemas.microsoft.com/office/drawing/2014/main" id="{C2CA624D-D69A-B525-1627-6207B418C297}"/>
+                <a16:creationId xmlns:a16="http://schemas.microsoft.com/office/drawing/2014/main" xmlns="" id="{C2CA624D-D69A-B525-1627-6207B418C297}"/>
               </a:ext>
             </a:extLst>
           </p:cNvPr>
@@ -4380,7 +4385,7 @@
           <p:cNvPr id="5" name="Imagem 4">
             <a:extLst>
               <a:ext uri="{FF2B5EF4-FFF2-40B4-BE49-F238E27FC236}">
-                <a16:creationId xmlns:a16="http://schemas.microsoft.com/office/drawing/2014/main" id="{9900166B-FFC1-B4C3-1337-FE65AB45E2E9}"/>
+                <a16:creationId xmlns:a16="http://schemas.microsoft.com/office/drawing/2014/main" xmlns="" id="{9900166B-FFC1-B4C3-1337-FE65AB45E2E9}"/>
               </a:ext>
             </a:extLst>
           </p:cNvPr>
@@ -4440,7 +4445,7 @@
           <p:cNvPr id="3" name="Espaço Reservado para Conteúdo 2">
             <a:extLst>
               <a:ext uri="{FF2B5EF4-FFF2-40B4-BE49-F238E27FC236}">
-                <a16:creationId xmlns:a16="http://schemas.microsoft.com/office/drawing/2014/main" id="{E64D6D75-C1E5-3FFC-BD7C-AE5D84F73826}"/>
+                <a16:creationId xmlns:a16="http://schemas.microsoft.com/office/drawing/2014/main" xmlns="" id="{E64D6D75-C1E5-3FFC-BD7C-AE5D84F73826}"/>
               </a:ext>
             </a:extLst>
           </p:cNvPr>
@@ -4554,7 +4559,7 @@
           <p:cNvPr id="2" name="Título 1">
             <a:extLst>
               <a:ext uri="{FF2B5EF4-FFF2-40B4-BE49-F238E27FC236}">
-                <a16:creationId xmlns:a16="http://schemas.microsoft.com/office/drawing/2014/main" id="{C2CA624D-D69A-B525-1627-6207B418C297}"/>
+                <a16:creationId xmlns:a16="http://schemas.microsoft.com/office/drawing/2014/main" xmlns="" id="{C2CA624D-D69A-B525-1627-6207B418C297}"/>
               </a:ext>
             </a:extLst>
           </p:cNvPr>
@@ -4590,7 +4595,7 @@
           <p:cNvPr id="4" name="Imagem 3">
             <a:extLst>
               <a:ext uri="{FF2B5EF4-FFF2-40B4-BE49-F238E27FC236}">
-                <a16:creationId xmlns:a16="http://schemas.microsoft.com/office/drawing/2014/main" id="{D37CD875-D999-D7C5-4A78-2F48EAEE2F6F}"/>
+                <a16:creationId xmlns:a16="http://schemas.microsoft.com/office/drawing/2014/main" xmlns="" id="{D37CD875-D999-D7C5-4A78-2F48EAEE2F6F}"/>
               </a:ext>
             </a:extLst>
           </p:cNvPr>
@@ -4650,7 +4655,7 @@
           <p:cNvPr id="3" name="Espaço Reservado para Conteúdo 2">
             <a:extLst>
               <a:ext uri="{FF2B5EF4-FFF2-40B4-BE49-F238E27FC236}">
-                <a16:creationId xmlns:a16="http://schemas.microsoft.com/office/drawing/2014/main" id="{E64D6D75-C1E5-3FFC-BD7C-AE5D84F73826}"/>
+                <a16:creationId xmlns:a16="http://schemas.microsoft.com/office/drawing/2014/main" xmlns="" id="{E64D6D75-C1E5-3FFC-BD7C-AE5D84F73826}"/>
               </a:ext>
             </a:extLst>
           </p:cNvPr>
@@ -4787,7 +4792,7 @@
           <p:cNvPr id="2" name="Título 1">
             <a:extLst>
               <a:ext uri="{FF2B5EF4-FFF2-40B4-BE49-F238E27FC236}">
-                <a16:creationId xmlns:a16="http://schemas.microsoft.com/office/drawing/2014/main" id="{C2CA624D-D69A-B525-1627-6207B418C297}"/>
+                <a16:creationId xmlns:a16="http://schemas.microsoft.com/office/drawing/2014/main" xmlns="" id="{C2CA624D-D69A-B525-1627-6207B418C297}"/>
               </a:ext>
             </a:extLst>
           </p:cNvPr>
@@ -4823,7 +4828,7 @@
           <p:cNvPr id="5" name="Imagem 4">
             <a:extLst>
               <a:ext uri="{FF2B5EF4-FFF2-40B4-BE49-F238E27FC236}">
-                <a16:creationId xmlns:a16="http://schemas.microsoft.com/office/drawing/2014/main" id="{B814AFBA-5203-828E-592E-6C7374A7CC33}"/>
+                <a16:creationId xmlns:a16="http://schemas.microsoft.com/office/drawing/2014/main" xmlns="" id="{B814AFBA-5203-828E-592E-6C7374A7CC33}"/>
               </a:ext>
             </a:extLst>
           </p:cNvPr>
@@ -4883,7 +4888,7 @@
           <p:cNvPr id="3" name="Espaço Reservado para Conteúdo 2">
             <a:extLst>
               <a:ext uri="{FF2B5EF4-FFF2-40B4-BE49-F238E27FC236}">
-                <a16:creationId xmlns:a16="http://schemas.microsoft.com/office/drawing/2014/main" id="{E64D6D75-C1E5-3FFC-BD7C-AE5D84F73826}"/>
+                <a16:creationId xmlns:a16="http://schemas.microsoft.com/office/drawing/2014/main" xmlns="" id="{E64D6D75-C1E5-3FFC-BD7C-AE5D84F73826}"/>
               </a:ext>
             </a:extLst>
           </p:cNvPr>
@@ -4997,7 +5002,7 @@
           <p:cNvPr id="2" name="Título 1">
             <a:extLst>
               <a:ext uri="{FF2B5EF4-FFF2-40B4-BE49-F238E27FC236}">
-                <a16:creationId xmlns:a16="http://schemas.microsoft.com/office/drawing/2014/main" id="{C2CA624D-D69A-B525-1627-6207B418C297}"/>
+                <a16:creationId xmlns:a16="http://schemas.microsoft.com/office/drawing/2014/main" xmlns="" id="{C2CA624D-D69A-B525-1627-6207B418C297}"/>
               </a:ext>
             </a:extLst>
           </p:cNvPr>
@@ -5033,7 +5038,7 @@
           <p:cNvPr id="4" name="Imagem 3">
             <a:extLst>
               <a:ext uri="{FF2B5EF4-FFF2-40B4-BE49-F238E27FC236}">
-                <a16:creationId xmlns:a16="http://schemas.microsoft.com/office/drawing/2014/main" id="{909953A4-E296-C866-3409-BD9136EC046E}"/>
+                <a16:creationId xmlns:a16="http://schemas.microsoft.com/office/drawing/2014/main" xmlns="" id="{909953A4-E296-C866-3409-BD9136EC046E}"/>
               </a:ext>
             </a:extLst>
           </p:cNvPr>
@@ -5093,7 +5098,7 @@
           <p:cNvPr id="3" name="Espaço Reservado para Conteúdo 2">
             <a:extLst>
               <a:ext uri="{FF2B5EF4-FFF2-40B4-BE49-F238E27FC236}">
-                <a16:creationId xmlns:a16="http://schemas.microsoft.com/office/drawing/2014/main" id="{E64D6D75-C1E5-3FFC-BD7C-AE5D84F73826}"/>
+                <a16:creationId xmlns:a16="http://schemas.microsoft.com/office/drawing/2014/main" xmlns="" id="{E64D6D75-C1E5-3FFC-BD7C-AE5D84F73826}"/>
               </a:ext>
             </a:extLst>
           </p:cNvPr>
@@ -5283,7 +5288,7 @@
           <p:cNvPr id="2" name="Título 1">
             <a:extLst>
               <a:ext uri="{FF2B5EF4-FFF2-40B4-BE49-F238E27FC236}">
-                <a16:creationId xmlns:a16="http://schemas.microsoft.com/office/drawing/2014/main" id="{C2CA624D-D69A-B525-1627-6207B418C297}"/>
+                <a16:creationId xmlns:a16="http://schemas.microsoft.com/office/drawing/2014/main" xmlns="" id="{C2CA624D-D69A-B525-1627-6207B418C297}"/>
               </a:ext>
             </a:extLst>
           </p:cNvPr>
@@ -5319,7 +5324,7 @@
           <p:cNvPr id="4" name="Imagem 3">
             <a:extLst>
               <a:ext uri="{FF2B5EF4-FFF2-40B4-BE49-F238E27FC236}">
-                <a16:creationId xmlns:a16="http://schemas.microsoft.com/office/drawing/2014/main" id="{A61E2DB3-AFAD-12DA-346E-9C70D91C7EFA}"/>
+                <a16:creationId xmlns:a16="http://schemas.microsoft.com/office/drawing/2014/main" xmlns="" id="{A61E2DB3-AFAD-12DA-346E-9C70D91C7EFA}"/>
               </a:ext>
             </a:extLst>
           </p:cNvPr>
@@ -5379,7 +5384,7 @@
           <p:cNvPr id="3" name="Subtítulo 2">
             <a:extLst>
               <a:ext uri="{FF2B5EF4-FFF2-40B4-BE49-F238E27FC236}">
-                <a16:creationId xmlns:a16="http://schemas.microsoft.com/office/drawing/2014/main" id="{A27794FD-FEA3-F1FB-1E32-03387D958899}"/>
+                <a16:creationId xmlns:a16="http://schemas.microsoft.com/office/drawing/2014/main" xmlns="" id="{A27794FD-FEA3-F1FB-1E32-03387D958899}"/>
               </a:ext>
             </a:extLst>
           </p:cNvPr>
@@ -5525,7 +5530,7 @@
           <p:cNvPr id="4" name="Imagem 3" descr="Faculdade de Tecnologia do Estado de São Paulo – Wikipédia ...">
             <a:extLst>
               <a:ext uri="{FF2B5EF4-FFF2-40B4-BE49-F238E27FC236}">
-                <a16:creationId xmlns:a16="http://schemas.microsoft.com/office/drawing/2014/main" id="{163E31FF-2CF2-54F8-54CC-907358D6943B}"/>
+                <a16:creationId xmlns:a16="http://schemas.microsoft.com/office/drawing/2014/main" xmlns="" id="{163E31FF-2CF2-54F8-54CC-907358D6943B}"/>
               </a:ext>
             </a:extLst>
           </p:cNvPr>
@@ -5596,7 +5601,7 @@
           <p:cNvPr id="3" name="Espaço Reservado para Conteúdo 2">
             <a:extLst>
               <a:ext uri="{FF2B5EF4-FFF2-40B4-BE49-F238E27FC236}">
-                <a16:creationId xmlns:a16="http://schemas.microsoft.com/office/drawing/2014/main" id="{E64D6D75-C1E5-3FFC-BD7C-AE5D84F73826}"/>
+                <a16:creationId xmlns:a16="http://schemas.microsoft.com/office/drawing/2014/main" xmlns="" id="{E64D6D75-C1E5-3FFC-BD7C-AE5D84F73826}"/>
               </a:ext>
             </a:extLst>
           </p:cNvPr>
@@ -5729,7 +5734,7 @@
           <p:cNvPr id="2" name="Título 1">
             <a:extLst>
               <a:ext uri="{FF2B5EF4-FFF2-40B4-BE49-F238E27FC236}">
-                <a16:creationId xmlns:a16="http://schemas.microsoft.com/office/drawing/2014/main" id="{C2CA624D-D69A-B525-1627-6207B418C297}"/>
+                <a16:creationId xmlns:a16="http://schemas.microsoft.com/office/drawing/2014/main" xmlns="" id="{C2CA624D-D69A-B525-1627-6207B418C297}"/>
               </a:ext>
             </a:extLst>
           </p:cNvPr>
@@ -5765,7 +5770,7 @@
           <p:cNvPr id="4" name="Imagem 3">
             <a:extLst>
               <a:ext uri="{FF2B5EF4-FFF2-40B4-BE49-F238E27FC236}">
-                <a16:creationId xmlns:a16="http://schemas.microsoft.com/office/drawing/2014/main" id="{DDF8C29F-57F7-0DB3-629A-CB95DF006F44}"/>
+                <a16:creationId xmlns:a16="http://schemas.microsoft.com/office/drawing/2014/main" xmlns="" id="{DDF8C29F-57F7-0DB3-629A-CB95DF006F44}"/>
               </a:ext>
             </a:extLst>
           </p:cNvPr>
@@ -5825,7 +5830,7 @@
           <p:cNvPr id="3" name="Espaço Reservado para Conteúdo 2">
             <a:extLst>
               <a:ext uri="{FF2B5EF4-FFF2-40B4-BE49-F238E27FC236}">
-                <a16:creationId xmlns:a16="http://schemas.microsoft.com/office/drawing/2014/main" id="{E64D6D75-C1E5-3FFC-BD7C-AE5D84F73826}"/>
+                <a16:creationId xmlns:a16="http://schemas.microsoft.com/office/drawing/2014/main" xmlns="" id="{E64D6D75-C1E5-3FFC-BD7C-AE5D84F73826}"/>
               </a:ext>
             </a:extLst>
           </p:cNvPr>
@@ -5972,7 +5977,7 @@
           <p:cNvPr id="2" name="Título 1">
             <a:extLst>
               <a:ext uri="{FF2B5EF4-FFF2-40B4-BE49-F238E27FC236}">
-                <a16:creationId xmlns:a16="http://schemas.microsoft.com/office/drawing/2014/main" id="{C2CA624D-D69A-B525-1627-6207B418C297}"/>
+                <a16:creationId xmlns:a16="http://schemas.microsoft.com/office/drawing/2014/main" xmlns="" id="{C2CA624D-D69A-B525-1627-6207B418C297}"/>
               </a:ext>
             </a:extLst>
           </p:cNvPr>
@@ -6008,7 +6013,7 @@
           <p:cNvPr id="4" name="Imagem 3">
             <a:extLst>
               <a:ext uri="{FF2B5EF4-FFF2-40B4-BE49-F238E27FC236}">
-                <a16:creationId xmlns:a16="http://schemas.microsoft.com/office/drawing/2014/main" id="{4EDA26B0-9B20-5892-2CAC-9B68DDD72E06}"/>
+                <a16:creationId xmlns:a16="http://schemas.microsoft.com/office/drawing/2014/main" xmlns="" id="{4EDA26B0-9B20-5892-2CAC-9B68DDD72E06}"/>
               </a:ext>
             </a:extLst>
           </p:cNvPr>
@@ -6068,7 +6073,7 @@
           <p:cNvPr id="3" name="Espaço Reservado para Conteúdo 2">
             <a:extLst>
               <a:ext uri="{FF2B5EF4-FFF2-40B4-BE49-F238E27FC236}">
-                <a16:creationId xmlns:a16="http://schemas.microsoft.com/office/drawing/2014/main" id="{E64D6D75-C1E5-3FFC-BD7C-AE5D84F73826}"/>
+                <a16:creationId xmlns:a16="http://schemas.microsoft.com/office/drawing/2014/main" xmlns="" id="{E64D6D75-C1E5-3FFC-BD7C-AE5D84F73826}"/>
               </a:ext>
             </a:extLst>
           </p:cNvPr>
@@ -6123,6 +6128,50 @@
               <a:ea typeface="Calibri" panose="020F0502020204030204" pitchFamily="34" charset="0"/>
               <a:cs typeface="Times New Roman" panose="02020603050405020304" pitchFamily="18" charset="0"/>
             </a:endParaRPr>
+          </a:p>
+          <a:p>
+            <a:pPr marL="0" indent="0">
+              <a:lnSpc>
+                <a:spcPct val="107000"/>
+              </a:lnSpc>
+              <a:spcAft>
+                <a:spcPts val="800"/>
+              </a:spcAft>
+              <a:buNone/>
+            </a:pPr>
+            <a:endParaRPr lang="pt-BR" sz="4000" dirty="0" smtClean="0">
+              <a:latin typeface="Calibri" panose="020F0502020204030204" pitchFamily="34" charset="0"/>
+              <a:ea typeface="Calibri" panose="020F0502020204030204" pitchFamily="34" charset="0"/>
+              <a:cs typeface="Times New Roman" panose="02020603050405020304" pitchFamily="18" charset="0"/>
+            </a:endParaRPr>
+          </a:p>
+          <a:p>
+            <a:pPr marL="0" indent="0">
+              <a:buNone/>
+            </a:pPr>
+            <a:r>
+              <a:rPr lang="pt-BR" sz="4000" b="1" dirty="0"/>
+              <a:t>Criar um programa em linguagem C programa que Calcule o consumo de </a:t>
+            </a:r>
+            <a:r>
+              <a:rPr lang="pt-BR" sz="4000" b="1" dirty="0" smtClean="0"/>
+              <a:t>um </a:t>
+            </a:r>
+            <a:r>
+              <a:rPr lang="pt-BR" sz="4000" b="1" dirty="0"/>
+              <a:t>veículo conforme os dados informado no teclado: </a:t>
+            </a:r>
+            <a:endParaRPr lang="pt-BR" sz="4000" dirty="0"/>
+          </a:p>
+          <a:p>
+            <a:pPr marL="0" indent="0">
+              <a:buNone/>
+            </a:pPr>
+            <a:r>
+              <a:rPr lang="pt-BR" sz="4000" b="1" dirty="0"/>
+              <a:t>Tempo em horas, velocidade média e consumo médio.</a:t>
+            </a:r>
+            <a:endParaRPr lang="pt-BR" sz="4000" dirty="0"/>
           </a:p>
           <a:p>
             <a:pPr marL="0" indent="0">
@@ -6177,7 +6226,7 @@
           <p:cNvPr id="2" name="Título 1">
             <a:extLst>
               <a:ext uri="{FF2B5EF4-FFF2-40B4-BE49-F238E27FC236}">
-                <a16:creationId xmlns:a16="http://schemas.microsoft.com/office/drawing/2014/main" id="{C2CA624D-D69A-B525-1627-6207B418C297}"/>
+                <a16:creationId xmlns:a16="http://schemas.microsoft.com/office/drawing/2014/main" xmlns="" id="{C2CA624D-D69A-B525-1627-6207B418C297}"/>
               </a:ext>
             </a:extLst>
           </p:cNvPr>
@@ -6208,6 +6257,28 @@
           </a:p>
         </p:txBody>
       </p:sp>
+      <p:pic>
+        <p:nvPicPr>
+          <p:cNvPr id="3" name="Imagem 2"/>
+          <p:cNvPicPr/>
+          <p:nvPr/>
+        </p:nvPicPr>
+        <p:blipFill>
+          <a:blip r:embed="rId2"/>
+          <a:stretch>
+            <a:fillRect/>
+          </a:stretch>
+        </p:blipFill>
+        <p:spPr>
+          <a:xfrm>
+            <a:off x="124691" y="716973"/>
+            <a:ext cx="11928764" cy="6037118"/>
+          </a:xfrm>
+          <a:prstGeom prst="rect">
+            <a:avLst/>
+          </a:prstGeom>
+        </p:spPr>
+      </p:pic>
     </p:spTree>
     <p:extLst>
       <p:ext uri="{BB962C8B-B14F-4D97-AF65-F5344CB8AC3E}">
@@ -6243,7 +6314,7 @@
           <p:cNvPr id="3" name="Espaço Reservado para Conteúdo 2">
             <a:extLst>
               <a:ext uri="{FF2B5EF4-FFF2-40B4-BE49-F238E27FC236}">
-                <a16:creationId xmlns:a16="http://schemas.microsoft.com/office/drawing/2014/main" id="{E64D6D75-C1E5-3FFC-BD7C-AE5D84F73826}"/>
+                <a16:creationId xmlns:a16="http://schemas.microsoft.com/office/drawing/2014/main" xmlns="" id="{E64D6D75-C1E5-3FFC-BD7C-AE5D84F73826}"/>
               </a:ext>
             </a:extLst>
           </p:cNvPr>
@@ -6425,7 +6496,7 @@
           <p:cNvPr id="2" name="Título 1">
             <a:extLst>
               <a:ext uri="{FF2B5EF4-FFF2-40B4-BE49-F238E27FC236}">
-                <a16:creationId xmlns:a16="http://schemas.microsoft.com/office/drawing/2014/main" id="{C2CA624D-D69A-B525-1627-6207B418C297}"/>
+                <a16:creationId xmlns:a16="http://schemas.microsoft.com/office/drawing/2014/main" xmlns="" id="{C2CA624D-D69A-B525-1627-6207B418C297}"/>
               </a:ext>
             </a:extLst>
           </p:cNvPr>
@@ -6461,7 +6532,7 @@
           <p:cNvPr id="4" name="Imagem 3">
             <a:extLst>
               <a:ext uri="{FF2B5EF4-FFF2-40B4-BE49-F238E27FC236}">
-                <a16:creationId xmlns:a16="http://schemas.microsoft.com/office/drawing/2014/main" id="{7B4E84F6-E4BE-3A1D-C0DD-B73325293D22}"/>
+                <a16:creationId xmlns:a16="http://schemas.microsoft.com/office/drawing/2014/main" xmlns="" id="{7B4E84F6-E4BE-3A1D-C0DD-B73325293D22}"/>
               </a:ext>
             </a:extLst>
           </p:cNvPr>
@@ -6521,7 +6592,7 @@
           <p:cNvPr id="3" name="Espaço Reservado para Conteúdo 2">
             <a:extLst>
               <a:ext uri="{FF2B5EF4-FFF2-40B4-BE49-F238E27FC236}">
-                <a16:creationId xmlns:a16="http://schemas.microsoft.com/office/drawing/2014/main" id="{E64D6D75-C1E5-3FFC-BD7C-AE5D84F73826}"/>
+                <a16:creationId xmlns:a16="http://schemas.microsoft.com/office/drawing/2014/main" xmlns="" id="{E64D6D75-C1E5-3FFC-BD7C-AE5D84F73826}"/>
               </a:ext>
             </a:extLst>
           </p:cNvPr>
@@ -6649,7 +6720,7 @@
           <p:cNvPr id="2" name="Título 1">
             <a:extLst>
               <a:ext uri="{FF2B5EF4-FFF2-40B4-BE49-F238E27FC236}">
-                <a16:creationId xmlns:a16="http://schemas.microsoft.com/office/drawing/2014/main" id="{C2CA624D-D69A-B525-1627-6207B418C297}"/>
+                <a16:creationId xmlns:a16="http://schemas.microsoft.com/office/drawing/2014/main" xmlns="" id="{C2CA624D-D69A-B525-1627-6207B418C297}"/>
               </a:ext>
             </a:extLst>
           </p:cNvPr>
@@ -6685,7 +6756,7 @@
           <p:cNvPr id="6" name="Imagem 5">
             <a:extLst>
               <a:ext uri="{FF2B5EF4-FFF2-40B4-BE49-F238E27FC236}">
-                <a16:creationId xmlns:a16="http://schemas.microsoft.com/office/drawing/2014/main" id="{32EBDF6C-EFBA-58B7-3B0E-0990C37CA588}"/>
+                <a16:creationId xmlns:a16="http://schemas.microsoft.com/office/drawing/2014/main" xmlns="" id="{32EBDF6C-EFBA-58B7-3B0E-0990C37CA588}"/>
               </a:ext>
             </a:extLst>
           </p:cNvPr>
@@ -6745,7 +6816,7 @@
           <p:cNvPr id="2" name="Título 1">
             <a:extLst>
               <a:ext uri="{FF2B5EF4-FFF2-40B4-BE49-F238E27FC236}">
-                <a16:creationId xmlns:a16="http://schemas.microsoft.com/office/drawing/2014/main" id="{368D6F5B-9C67-9A32-262C-E6B643FA8C66}"/>
+                <a16:creationId xmlns:a16="http://schemas.microsoft.com/office/drawing/2014/main" xmlns="" id="{368D6F5B-9C67-9A32-262C-E6B643FA8C66}"/>
               </a:ext>
             </a:extLst>
           </p:cNvPr>
@@ -6817,7 +6888,7 @@
           <p:cNvPr id="3" name="Espaço Reservado para Conteúdo 2">
             <a:extLst>
               <a:ext uri="{FF2B5EF4-FFF2-40B4-BE49-F238E27FC236}">
-                <a16:creationId xmlns:a16="http://schemas.microsoft.com/office/drawing/2014/main" id="{E64D6D75-C1E5-3FFC-BD7C-AE5D84F73826}"/>
+                <a16:creationId xmlns:a16="http://schemas.microsoft.com/office/drawing/2014/main" xmlns="" id="{E64D6D75-C1E5-3FFC-BD7C-AE5D84F73826}"/>
               </a:ext>
             </a:extLst>
           </p:cNvPr>
@@ -6945,7 +7016,7 @@
           <p:cNvPr id="2" name="Título 1">
             <a:extLst>
               <a:ext uri="{FF2B5EF4-FFF2-40B4-BE49-F238E27FC236}">
-                <a16:creationId xmlns:a16="http://schemas.microsoft.com/office/drawing/2014/main" id="{C2CA624D-D69A-B525-1627-6207B418C297}"/>
+                <a16:creationId xmlns:a16="http://schemas.microsoft.com/office/drawing/2014/main" xmlns="" id="{C2CA624D-D69A-B525-1627-6207B418C297}"/>
               </a:ext>
             </a:extLst>
           </p:cNvPr>
@@ -6981,7 +7052,7 @@
           <p:cNvPr id="4" name="Imagem 3">
             <a:extLst>
               <a:ext uri="{FF2B5EF4-FFF2-40B4-BE49-F238E27FC236}">
-                <a16:creationId xmlns:a16="http://schemas.microsoft.com/office/drawing/2014/main" id="{00E810F2-230F-3655-CF5D-7F0F3C3EBF1F}"/>
+                <a16:creationId xmlns:a16="http://schemas.microsoft.com/office/drawing/2014/main" xmlns="" id="{00E810F2-230F-3655-CF5D-7F0F3C3EBF1F}"/>
               </a:ext>
             </a:extLst>
           </p:cNvPr>
@@ -7041,7 +7112,7 @@
           <p:cNvPr id="3" name="Espaço Reservado para Conteúdo 2">
             <a:extLst>
               <a:ext uri="{FF2B5EF4-FFF2-40B4-BE49-F238E27FC236}">
-                <a16:creationId xmlns:a16="http://schemas.microsoft.com/office/drawing/2014/main" id="{E64D6D75-C1E5-3FFC-BD7C-AE5D84F73826}"/>
+                <a16:creationId xmlns:a16="http://schemas.microsoft.com/office/drawing/2014/main" xmlns="" id="{E64D6D75-C1E5-3FFC-BD7C-AE5D84F73826}"/>
               </a:ext>
             </a:extLst>
           </p:cNvPr>
@@ -7169,7 +7240,7 @@
           <p:cNvPr id="2" name="Título 1">
             <a:extLst>
               <a:ext uri="{FF2B5EF4-FFF2-40B4-BE49-F238E27FC236}">
-                <a16:creationId xmlns:a16="http://schemas.microsoft.com/office/drawing/2014/main" id="{C2CA624D-D69A-B525-1627-6207B418C297}"/>
+                <a16:creationId xmlns:a16="http://schemas.microsoft.com/office/drawing/2014/main" xmlns="" id="{C2CA624D-D69A-B525-1627-6207B418C297}"/>
               </a:ext>
             </a:extLst>
           </p:cNvPr>
@@ -7205,7 +7276,7 @@
           <p:cNvPr id="4" name="Imagem 3">
             <a:extLst>
               <a:ext uri="{FF2B5EF4-FFF2-40B4-BE49-F238E27FC236}">
-                <a16:creationId xmlns:a16="http://schemas.microsoft.com/office/drawing/2014/main" id="{992A2349-B359-65E1-FDF2-F9B61C35DDA9}"/>
+                <a16:creationId xmlns:a16="http://schemas.microsoft.com/office/drawing/2014/main" xmlns="" id="{992A2349-B359-65E1-FDF2-F9B61C35DDA9}"/>
               </a:ext>
             </a:extLst>
           </p:cNvPr>
@@ -7265,7 +7336,7 @@
           <p:cNvPr id="3" name="Espaço Reservado para Conteúdo 2">
             <a:extLst>
               <a:ext uri="{FF2B5EF4-FFF2-40B4-BE49-F238E27FC236}">
-                <a16:creationId xmlns:a16="http://schemas.microsoft.com/office/drawing/2014/main" id="{E64D6D75-C1E5-3FFC-BD7C-AE5D84F73826}"/>
+                <a16:creationId xmlns:a16="http://schemas.microsoft.com/office/drawing/2014/main" xmlns="" id="{E64D6D75-C1E5-3FFC-BD7C-AE5D84F73826}"/>
               </a:ext>
             </a:extLst>
           </p:cNvPr>
@@ -7387,7 +7458,7 @@
           <p:cNvPr id="2" name="Título 1">
             <a:extLst>
               <a:ext uri="{FF2B5EF4-FFF2-40B4-BE49-F238E27FC236}">
-                <a16:creationId xmlns:a16="http://schemas.microsoft.com/office/drawing/2014/main" id="{C2CA624D-D69A-B525-1627-6207B418C297}"/>
+                <a16:creationId xmlns:a16="http://schemas.microsoft.com/office/drawing/2014/main" xmlns="" id="{C2CA624D-D69A-B525-1627-6207B418C297}"/>
               </a:ext>
             </a:extLst>
           </p:cNvPr>
@@ -7423,7 +7494,7 @@
           <p:cNvPr id="4" name="Imagem 3" descr="Interface gráfica do usuário, Texto, Aplicativo&#10;&#10;Descrição gerada automaticamente">
             <a:extLst>
               <a:ext uri="{FF2B5EF4-FFF2-40B4-BE49-F238E27FC236}">
-                <a16:creationId xmlns:a16="http://schemas.microsoft.com/office/drawing/2014/main" id="{CCBB0B34-9A9F-ECE8-F171-E2E3289D78E6}"/>
+                <a16:creationId xmlns:a16="http://schemas.microsoft.com/office/drawing/2014/main" xmlns="" id="{CCBB0B34-9A9F-ECE8-F171-E2E3289D78E6}"/>
               </a:ext>
             </a:extLst>
           </p:cNvPr>
@@ -7483,7 +7554,7 @@
           <p:cNvPr id="3" name="Espaço Reservado para Conteúdo 2">
             <a:extLst>
               <a:ext uri="{FF2B5EF4-FFF2-40B4-BE49-F238E27FC236}">
-                <a16:creationId xmlns:a16="http://schemas.microsoft.com/office/drawing/2014/main" id="{E64D6D75-C1E5-3FFC-BD7C-AE5D84F73826}"/>
+                <a16:creationId xmlns:a16="http://schemas.microsoft.com/office/drawing/2014/main" xmlns="" id="{E64D6D75-C1E5-3FFC-BD7C-AE5D84F73826}"/>
               </a:ext>
             </a:extLst>
           </p:cNvPr>
@@ -7604,7 +7675,7 @@
           <p:cNvPr id="2" name="Título 1">
             <a:extLst>
               <a:ext uri="{FF2B5EF4-FFF2-40B4-BE49-F238E27FC236}">
-                <a16:creationId xmlns:a16="http://schemas.microsoft.com/office/drawing/2014/main" id="{C2CA624D-D69A-B525-1627-6207B418C297}"/>
+                <a16:creationId xmlns:a16="http://schemas.microsoft.com/office/drawing/2014/main" xmlns="" id="{C2CA624D-D69A-B525-1627-6207B418C297}"/>
               </a:ext>
             </a:extLst>
           </p:cNvPr>
@@ -7640,7 +7711,7 @@
           <p:cNvPr id="5" name="Imagem 4">
             <a:extLst>
               <a:ext uri="{FF2B5EF4-FFF2-40B4-BE49-F238E27FC236}">
-                <a16:creationId xmlns:a16="http://schemas.microsoft.com/office/drawing/2014/main" id="{5E86C582-11BA-FA8B-BB01-D2A56D8DE668}"/>
+                <a16:creationId xmlns:a16="http://schemas.microsoft.com/office/drawing/2014/main" xmlns="" id="{5E86C582-11BA-FA8B-BB01-D2A56D8DE668}"/>
               </a:ext>
             </a:extLst>
           </p:cNvPr>
@@ -7700,7 +7771,7 @@
           <p:cNvPr id="3" name="Espaço Reservado para Conteúdo 2">
             <a:extLst>
               <a:ext uri="{FF2B5EF4-FFF2-40B4-BE49-F238E27FC236}">
-                <a16:creationId xmlns:a16="http://schemas.microsoft.com/office/drawing/2014/main" id="{E64D6D75-C1E5-3FFC-BD7C-AE5D84F73826}"/>
+                <a16:creationId xmlns:a16="http://schemas.microsoft.com/office/drawing/2014/main" xmlns="" id="{E64D6D75-C1E5-3FFC-BD7C-AE5D84F73826}"/>
               </a:ext>
             </a:extLst>
           </p:cNvPr>
@@ -7837,7 +7908,7 @@
           <p:cNvPr id="2" name="Título 1">
             <a:extLst>
               <a:ext uri="{FF2B5EF4-FFF2-40B4-BE49-F238E27FC236}">
-                <a16:creationId xmlns:a16="http://schemas.microsoft.com/office/drawing/2014/main" id="{C2CA624D-D69A-B525-1627-6207B418C297}"/>
+                <a16:creationId xmlns:a16="http://schemas.microsoft.com/office/drawing/2014/main" xmlns="" id="{C2CA624D-D69A-B525-1627-6207B418C297}"/>
               </a:ext>
             </a:extLst>
           </p:cNvPr>
@@ -7873,7 +7944,7 @@
           <p:cNvPr id="4" name="Imagem 3">
             <a:extLst>
               <a:ext uri="{FF2B5EF4-FFF2-40B4-BE49-F238E27FC236}">
-                <a16:creationId xmlns:a16="http://schemas.microsoft.com/office/drawing/2014/main" id="{0613056E-E76C-80D8-4E18-3510CEDFD8E8}"/>
+                <a16:creationId xmlns:a16="http://schemas.microsoft.com/office/drawing/2014/main" xmlns="" id="{0613056E-E76C-80D8-4E18-3510CEDFD8E8}"/>
               </a:ext>
             </a:extLst>
           </p:cNvPr>
@@ -8207,6 +8278,15 @@
 </file>
 
 <file path=customXml/item1.xml><?xml version="1.0" encoding="utf-8"?>
+<?mso-contentType ?>
+<FormTemplates xmlns="http://schemas.microsoft.com/sharepoint/v3/contenttype/forms">
+  <Display>DocumentLibraryForm</Display>
+  <Edit>DocumentLibraryForm</Edit>
+  <New>DocumentLibraryForm</New>
+</FormTemplates>
+</file>
+
+<file path=customXml/item2.xml><?xml version="1.0" encoding="utf-8"?>
 <ct:contentTypeSchema xmlns:ct="http://schemas.microsoft.com/office/2006/metadata/contentType" xmlns:ma="http://schemas.microsoft.com/office/2006/metadata/properties/metaAttributes" ct:_="" ma:_="" ma:contentTypeName="Document" ma:contentTypeID="0x010100470ACA484E10974AAF14308201C8EC44" ma:contentTypeVersion="12" ma:contentTypeDescription="Create a new document." ma:contentTypeScope="" ma:versionID="bdbb9e3332306a57094df3e1053a71cd">
   <xsd:schema xmlns:xsd="http://www.w3.org/2001/XMLSchema" xmlns:xs="http://www.w3.org/2001/XMLSchema" xmlns:p="http://schemas.microsoft.com/office/2006/metadata/properties" xmlns:ns3="cdd1733f-32d3-4ab9-8d53-4ca35bc3239d" xmlns:ns4="618ae11f-b09b-4dd6-96d9-be02694534aa" targetNamespace="http://schemas.microsoft.com/office/2006/metadata/properties" ma:root="true" ma:fieldsID="9b3f0aa60753a3e10bd187ee0ac542a9" ns3:_="" ns4:_="">
     <xsd:import namespace="cdd1733f-32d3-4ab9-8d53-4ca35bc3239d"/>
@@ -8421,15 +8501,6 @@
 </ct:contentTypeSchema>
 </file>
 
-<file path=customXml/item2.xml><?xml version="1.0" encoding="utf-8"?>
-<?mso-contentType ?>
-<FormTemplates xmlns="http://schemas.microsoft.com/sharepoint/v3/contenttype/forms">
-  <Display>DocumentLibraryForm</Display>
-  <Edit>DocumentLibraryForm</Edit>
-  <New>DocumentLibraryForm</New>
-</FormTemplates>
-</file>
-
 <file path=customXml/item3.xml><?xml version="1.0" encoding="utf-8"?>
 <p:properties xmlns:p="http://schemas.microsoft.com/office/2006/metadata/properties" xmlns:xsi="http://www.w3.org/2001/XMLSchema-instance" xmlns:pc="http://schemas.microsoft.com/office/infopath/2007/PartnerControls">
   <documentManagement>
@@ -8439,6 +8510,14 @@
 </file>
 
 <file path=customXml/itemProps1.xml><?xml version="1.0" encoding="utf-8"?>
+<ds:datastoreItem xmlns:ds="http://schemas.openxmlformats.org/officeDocument/2006/customXml" ds:itemID="{4C8E0F7E-1D1D-4B30-B412-69D49C703EC2}">
+  <ds:schemaRefs>
+    <ds:schemaRef ds:uri="http://schemas.microsoft.com/sharepoint/v3/contenttype/forms"/>
+  </ds:schemaRefs>
+</ds:datastoreItem>
+</file>
+
+<file path=customXml/itemProps2.xml><?xml version="1.0" encoding="utf-8"?>
 <ds:datastoreItem xmlns:ds="http://schemas.openxmlformats.org/officeDocument/2006/customXml" ds:itemID="{964AECC5-5962-4633-9DD7-98A0FDF4F9B8}">
   <ds:schemaRefs>
     <ds:schemaRef ds:uri="http://schemas.microsoft.com/office/2006/metadata/contentType"/>
@@ -8453,14 +8532,6 @@
     <ds:schemaRef ds:uri="http://purl.org/dc/elements/1.1/"/>
     <ds:schemaRef ds:uri="http://purl.org/dc/terms/"/>
     <ds:schemaRef ds:uri="http://schemas.microsoft.com/internal/obd"/>
-  </ds:schemaRefs>
-</ds:datastoreItem>
-</file>
-
-<file path=customXml/itemProps2.xml><?xml version="1.0" encoding="utf-8"?>
-<ds:datastoreItem xmlns:ds="http://schemas.openxmlformats.org/officeDocument/2006/customXml" ds:itemID="{4C8E0F7E-1D1D-4B30-B412-69D49C703EC2}">
-  <ds:schemaRefs>
-    <ds:schemaRef ds:uri="http://schemas.microsoft.com/sharepoint/v3/contenttype/forms"/>
   </ds:schemaRefs>
 </ds:datastoreItem>
 </file>

</xml_diff>